<commit_message>
docs: sửa slot 3
</commit_message>
<xml_diff>
--- a/slides/2.4 Visualization of Dashboards.pptx
+++ b/slides/2.4 Visualization of Dashboards.pptx
@@ -974,8 +974,8 @@
         </p:nvSpPr>
         <p:spPr>
           <a:xfrm>
-            <a:off x="429100" y="687314"/>
-            <a:ext cx="6001500" cy="3427500"/>
+            <a:off x="384175" y="687388"/>
+            <a:ext cx="6091238" cy="3427412"/>
           </a:xfrm>
           <a:custGeom>
             <a:avLst/>
@@ -21145,14 +21145,14 @@
               <a:buChar char="●"/>
             </a:pPr>
             <a:r>
-              <a:rPr lang="en-GB" sz="1800">
+              <a:rPr lang="en-GB" sz="1800" dirty="0">
                 <a:solidFill>
                   <a:srgbClr val="1F1F1F"/>
                 </a:solidFill>
               </a:rPr>
               <a:t>Responsiveness and Adaptability: Ensure the dashboard is responsive and adaptable to different screen sizes and devices, allowing users to access and view the dashboard on various platforms.</a:t>
             </a:r>
-            <a:endParaRPr sz="1800">
+            <a:endParaRPr sz="1800" dirty="0">
               <a:solidFill>
                 <a:srgbClr val="1F1F1F"/>
               </a:solidFill>
@@ -21786,7 +21786,7 @@
               <a:buNone/>
             </a:pPr>
             <a:r>
-              <a:rPr lang="en-GB" sz="1800" b="1" i="1">
+              <a:rPr lang="en-GB" sz="1800" b="1" i="1" dirty="0">
                 <a:solidFill>
                   <a:srgbClr val="0B5394"/>
                 </a:solidFill>
@@ -21797,7 +21797,7 @@
               </a:rPr>
               <a:t>Examples of Dashboard Visualization</a:t>
             </a:r>
-            <a:endParaRPr sz="1800" b="1" i="1">
+            <a:endParaRPr sz="1800" b="1" i="1" dirty="0">
               <a:solidFill>
                 <a:srgbClr val="0B5394"/>
               </a:solidFill>
@@ -21931,14 +21931,14 @@
               <a:buChar char="●"/>
             </a:pPr>
             <a:r>
-              <a:rPr lang="en-GB" sz="1800">
+              <a:rPr lang="en-GB" sz="1800" dirty="0">
                 <a:solidFill>
                   <a:srgbClr val="1F1F1F"/>
                 </a:solidFill>
               </a:rPr>
               <a:t>Tableau: A popular and powerful data visualization tool with extensive dashboard creation capabilities.</a:t>
             </a:r>
-            <a:endParaRPr sz="1800">
+            <a:endParaRPr sz="1800" dirty="0">
               <a:solidFill>
                 <a:srgbClr val="1F1F1F"/>
               </a:solidFill>
@@ -22069,7 +22069,7 @@
               <a:buNone/>
             </a:pPr>
             <a:r>
-              <a:rPr lang="en-GB" sz="1800" b="1" i="1">
+              <a:rPr lang="en-GB" sz="1800" b="1" i="1" dirty="0">
                 <a:solidFill>
                   <a:srgbClr val="0B5394"/>
                 </a:solidFill>
@@ -22080,7 +22080,7 @@
               </a:rPr>
               <a:t>Tools for Creating Interactive Dashboards</a:t>
             </a:r>
-            <a:endParaRPr sz="1800" b="1" i="1">
+            <a:endParaRPr sz="1800" b="1" i="1" dirty="0">
               <a:solidFill>
                 <a:srgbClr val="0B5394"/>
               </a:solidFill>
@@ -23602,14 +23602,14 @@
               <a:buChar char="●"/>
             </a:pPr>
             <a:r>
-              <a:rPr lang="en-GB" sz="1800">
+              <a:rPr lang="en-GB" sz="1800" dirty="0">
                 <a:solidFill>
                   <a:srgbClr val="B7B7B7"/>
                 </a:solidFill>
               </a:rPr>
               <a:t>Understand the concept and importance of data visualization in the context of data mining.</a:t>
             </a:r>
-            <a:endParaRPr sz="1800">
+            <a:endParaRPr sz="1800" dirty="0">
               <a:solidFill>
                 <a:srgbClr val="B7B7B7"/>
               </a:solidFill>
@@ -23633,14 +23633,14 @@
               <a:buChar char="●"/>
             </a:pPr>
             <a:r>
-              <a:rPr lang="en-GB" sz="1800">
+              <a:rPr lang="en-GB" sz="1800" dirty="0">
                 <a:solidFill>
                   <a:srgbClr val="B7B7B7"/>
                 </a:solidFill>
               </a:rPr>
               <a:t>Explore the goals and benefits of using data visualization techniques.</a:t>
             </a:r>
-            <a:endParaRPr sz="1800">
+            <a:endParaRPr sz="1800" dirty="0">
               <a:solidFill>
                 <a:srgbClr val="B7B7B7"/>
               </a:solidFill>
@@ -23664,14 +23664,14 @@
               <a:buChar char="●"/>
             </a:pPr>
             <a:r>
-              <a:rPr lang="en-GB" sz="1800">
+              <a:rPr lang="en-GB" sz="1800" dirty="0">
                 <a:solidFill>
                   <a:srgbClr val="B7B7B7"/>
                 </a:solidFill>
               </a:rPr>
               <a:t>Learn various techniques for numerical data, including line charts, bar charts, scatter plots, etc.</a:t>
             </a:r>
-            <a:endParaRPr sz="1800">
+            <a:endParaRPr sz="1800" dirty="0">
               <a:solidFill>
                 <a:srgbClr val="B7B7B7"/>
               </a:solidFill>
@@ -23695,14 +23695,14 @@
               <a:buChar char="●"/>
             </a:pPr>
             <a:r>
-              <a:rPr lang="en-GB" sz="1800">
+              <a:rPr lang="en-GB" sz="1800" dirty="0">
                 <a:solidFill>
                   <a:srgbClr val="B7B7B7"/>
                 </a:solidFill>
               </a:rPr>
               <a:t>Understand the techniques specific to non-numerical data, such as pie charts, word clouds, network graphs, etc.</a:t>
             </a:r>
-            <a:endParaRPr sz="1800">
+            <a:endParaRPr sz="1800" dirty="0">
               <a:solidFill>
                 <a:srgbClr val="B7B7B7"/>
               </a:solidFill>
@@ -23723,14 +23723,14 @@
               <a:buChar char="●"/>
             </a:pPr>
             <a:r>
-              <a:rPr lang="en-GB" sz="1800">
+              <a:rPr lang="en-GB" sz="1800" dirty="0">
                 <a:solidFill>
                   <a:srgbClr val="1F1F1F"/>
                 </a:solidFill>
               </a:rPr>
               <a:t>Gain insights into the visualization of dashboards, including the components, design principles, and interactive features.</a:t>
             </a:r>
-            <a:endParaRPr sz="1800" b="0" i="0" u="none">
+            <a:endParaRPr sz="1800" b="0" i="0" u="none" dirty="0">
               <a:solidFill>
                 <a:schemeClr val="dk1"/>
               </a:solidFill>
@@ -23949,14 +23949,30 @@
               <a:buChar char="●"/>
             </a:pPr>
             <a:r>
-              <a:rPr lang="en-GB" sz="1800">
+              <a:rPr lang="en-GB" sz="1800" dirty="0">
                 <a:solidFill>
                   <a:srgbClr val="1F1F1F"/>
                 </a:solidFill>
               </a:rPr>
-              <a:t>Dashboards are visual interfaces that provide a consolidated view of key information and metrics, allowing users to monitor and analyze data in real-time. They combine various visualizations, charts, tables, and other components to present an overview of relevant data and facilitate decision-making.</a:t>
+              <a:t>Dashboards are visual interfaces that provide a consolidated view of key information and metrics, allowing users to monitor and </a:t>
             </a:r>
-            <a:endParaRPr sz="1800">
+            <a:r>
+              <a:rPr lang="en-GB" sz="1800" dirty="0" err="1">
+                <a:solidFill>
+                  <a:srgbClr val="1F1F1F"/>
+                </a:solidFill>
+              </a:rPr>
+              <a:t>analyze</a:t>
+            </a:r>
+            <a:r>
+              <a:rPr lang="en-GB" sz="1800" dirty="0">
+                <a:solidFill>
+                  <a:srgbClr val="1F1F1F"/>
+                </a:solidFill>
+              </a:rPr>
+              <a:t> data in real-time. They combine various visualizations, charts, tables, and other components to present an overview of relevant data and facilitate decision-making.</a:t>
+            </a:r>
+            <a:endParaRPr sz="1800" dirty="0">
               <a:solidFill>
                 <a:srgbClr val="1F1F1F"/>
               </a:solidFill>
@@ -24087,7 +24103,7 @@
               <a:buNone/>
             </a:pPr>
             <a:r>
-              <a:rPr lang="en-GB" sz="1800" b="1" i="1">
+              <a:rPr lang="en-GB" sz="1800" b="1" i="1" dirty="0">
                 <a:solidFill>
                   <a:srgbClr val="0B5394"/>
                 </a:solidFill>
@@ -24098,7 +24114,7 @@
               </a:rPr>
               <a:t>Dashboards</a:t>
             </a:r>
-            <a:endParaRPr b="1" i="1">
+            <a:endParaRPr b="1" i="1" dirty="0">
               <a:solidFill>
                 <a:srgbClr val="0B5394"/>
               </a:solidFill>
@@ -24414,7 +24430,7 @@
               <a:buNone/>
             </a:pPr>
             <a:r>
-              <a:rPr lang="en-GB" sz="1800" b="1" i="1">
+              <a:rPr lang="en-GB" sz="1800" b="1" i="1" dirty="0">
                 <a:solidFill>
                   <a:srgbClr val="0B5394"/>
                 </a:solidFill>
@@ -24425,7 +24441,7 @@
               </a:rPr>
               <a:t>Definition and Purpose of Dashboards</a:t>
             </a:r>
-            <a:endParaRPr b="1" i="1">
+            <a:endParaRPr b="1" i="1" dirty="0">
               <a:solidFill>
                 <a:srgbClr val="0B5394"/>
               </a:solidFill>
@@ -24559,14 +24575,14 @@
               <a:buChar char="●"/>
             </a:pPr>
             <a:r>
-              <a:rPr lang="en-GB" sz="1800">
+              <a:rPr lang="en-GB" sz="1800" dirty="0">
                 <a:solidFill>
                   <a:srgbClr val="1F1F1F"/>
                 </a:solidFill>
               </a:rPr>
               <a:t>Widgets: Dashboards consist of various widgets such as charts, graphs, tables, gauges, or maps, representing different aspects of the data.</a:t>
             </a:r>
-            <a:endParaRPr sz="1800">
+            <a:endParaRPr sz="1800" dirty="0">
               <a:solidFill>
                 <a:srgbClr val="1F1F1F"/>
               </a:solidFill>
@@ -24587,14 +24603,14 @@
               <a:buChar char="●"/>
             </a:pPr>
             <a:r>
-              <a:rPr lang="en-GB" sz="1800">
+              <a:rPr lang="en-GB" sz="1800" dirty="0">
                 <a:solidFill>
                   <a:srgbClr val="1F1F1F"/>
                 </a:solidFill>
               </a:rPr>
               <a:t>Filters: Interactive filters allow users to customize the view of the dashboard by selecting specific dimensions, time periods, or other parameters.</a:t>
             </a:r>
-            <a:endParaRPr sz="1800">
+            <a:endParaRPr sz="1800" dirty="0">
               <a:solidFill>
                 <a:srgbClr val="1F1F1F"/>
               </a:solidFill>
@@ -24615,14 +24631,14 @@
               <a:buChar char="●"/>
             </a:pPr>
             <a:r>
-              <a:rPr lang="en-GB" sz="1800">
+              <a:rPr lang="en-GB" sz="1800" dirty="0">
                 <a:solidFill>
                   <a:srgbClr val="1F1F1F"/>
                 </a:solidFill>
               </a:rPr>
               <a:t>Drill-down and Drill-up: Dashboards often provide the ability to drill down into specific details or drill up to higher-level summaries for deeper analysis.</a:t>
             </a:r>
-            <a:endParaRPr sz="1800">
+            <a:endParaRPr sz="1800" dirty="0">
               <a:solidFill>
                 <a:srgbClr val="1F1F1F"/>
               </a:solidFill>
@@ -24643,14 +24659,14 @@
               <a:buChar char="●"/>
             </a:pPr>
             <a:r>
-              <a:rPr lang="en-GB" sz="1800">
+              <a:rPr lang="en-GB" sz="1800" dirty="0">
                 <a:solidFill>
                   <a:srgbClr val="1F1F1F"/>
                 </a:solidFill>
               </a:rPr>
               <a:t>Alerts and Notifications: Dashboards may include alerts or notifications that highlight critical information or anomalies, helping users stay informed about important events or changes.</a:t>
             </a:r>
-            <a:endParaRPr sz="1800">
+            <a:endParaRPr sz="1800" dirty="0">
               <a:solidFill>
                 <a:srgbClr val="1F1F1F"/>
               </a:solidFill>
@@ -24926,14 +24942,14 @@
               <a:buChar char="●"/>
             </a:pPr>
             <a:r>
-              <a:rPr lang="en-GB" sz="1800">
+              <a:rPr lang="en-GB" sz="1800" dirty="0">
                 <a:solidFill>
                   <a:srgbClr val="1F1F1F"/>
                 </a:solidFill>
               </a:rPr>
               <a:t>Data Organization and Layout: Arrange the components of the dashboard in a logical and intuitive manner, ensuring that related information is grouped together for easy understanding.</a:t>
             </a:r>
-            <a:endParaRPr sz="1800">
+            <a:endParaRPr sz="1800" dirty="0">
               <a:solidFill>
                 <a:srgbClr val="1F1F1F"/>
               </a:solidFill>
@@ -25064,7 +25080,7 @@
               <a:buNone/>
             </a:pPr>
             <a:r>
-              <a:rPr lang="en-GB" sz="1800" b="1" i="1">
+              <a:rPr lang="en-GB" sz="1800" b="1" i="1" dirty="0">
                 <a:solidFill>
                   <a:srgbClr val="0B5394"/>
                 </a:solidFill>
@@ -25075,7 +25091,7 @@
               </a:rPr>
               <a:t>Design Principles for Effective Dashboards</a:t>
             </a:r>
-            <a:endParaRPr sz="1800" b="1" i="1">
+            <a:endParaRPr sz="1800" b="1" i="1" dirty="0">
               <a:solidFill>
                 <a:srgbClr val="0B5394"/>
               </a:solidFill>
@@ -25317,14 +25333,30 @@
               <a:buChar char="●"/>
             </a:pPr>
             <a:r>
-              <a:rPr lang="en-GB" sz="1800">
+              <a:rPr lang="en-GB" sz="1800" dirty="0">
                 <a:solidFill>
                   <a:srgbClr val="1F1F1F"/>
                 </a:solidFill>
               </a:rPr>
-              <a:t>Visual Hierarchy and Emphasis: Use visual cues such as size, color, and positioning to emphasize important data and guide users' attention to the most relevant insights.</a:t>
+              <a:t>Visual Hierarchy and Emphasis: Use visual cues such as size, </a:t>
             </a:r>
-            <a:endParaRPr sz="1800">
+            <a:r>
+              <a:rPr lang="en-GB" sz="1800" dirty="0" err="1">
+                <a:solidFill>
+                  <a:srgbClr val="1F1F1F"/>
+                </a:solidFill>
+              </a:rPr>
+              <a:t>color</a:t>
+            </a:r>
+            <a:r>
+              <a:rPr lang="en-GB" sz="1800" dirty="0">
+                <a:solidFill>
+                  <a:srgbClr val="1F1F1F"/>
+                </a:solidFill>
+              </a:rPr>
+              <a:t>, and positioning to emphasize important data and guide users' attention to the most relevant insights.</a:t>
+            </a:r>
+            <a:endParaRPr sz="1800" dirty="0">
               <a:solidFill>
                 <a:srgbClr val="1F1F1F"/>
               </a:solidFill>
@@ -25708,14 +25740,54 @@
               <a:buChar char="●"/>
             </a:pPr>
             <a:r>
-              <a:rPr lang="en-GB" sz="1800">
+              <a:rPr lang="en-GB" sz="1800" dirty="0" err="1">
                 <a:solidFill>
                   <a:srgbClr val="1F1F1F"/>
                 </a:solidFill>
               </a:rPr>
-              <a:t>Color Schemes and Aesthetics: Choose a visually pleasing color scheme that aligns with the data and the overall purpose of the dashboard. Avoid overwhelming or distracting color combinations.</a:t>
+              <a:t>Color</a:t>
             </a:r>
-            <a:endParaRPr sz="1800">
+            <a:r>
+              <a:rPr lang="en-GB" sz="1800" dirty="0">
+                <a:solidFill>
+                  <a:srgbClr val="1F1F1F"/>
+                </a:solidFill>
+              </a:rPr>
+              <a:t> Schemes and Aesthetics: Choose a visually pleasing </a:t>
+            </a:r>
+            <a:r>
+              <a:rPr lang="en-GB" sz="1800" dirty="0" err="1">
+                <a:solidFill>
+                  <a:srgbClr val="1F1F1F"/>
+                </a:solidFill>
+              </a:rPr>
+              <a:t>color</a:t>
+            </a:r>
+            <a:r>
+              <a:rPr lang="en-GB" sz="1800" dirty="0">
+                <a:solidFill>
+                  <a:srgbClr val="1F1F1F"/>
+                </a:solidFill>
+              </a:rPr>
+              <a:t> scheme that aligns with the data and the overall purpose of the dashboard. Avoid overwhelming or distracting </a:t>
+            </a:r>
+            <a:r>
+              <a:rPr lang="en-GB" sz="1800" dirty="0" err="1">
+                <a:solidFill>
+                  <a:srgbClr val="1F1F1F"/>
+                </a:solidFill>
+              </a:rPr>
+              <a:t>color</a:t>
+            </a:r>
+            <a:r>
+              <a:rPr lang="en-GB" sz="1800" dirty="0">
+                <a:solidFill>
+                  <a:srgbClr val="1F1F1F"/>
+                </a:solidFill>
+              </a:rPr>
+              <a:t> combinations.</a:t>
+            </a:r>
+            <a:endParaRPr sz="1800" dirty="0">
               <a:solidFill>
                 <a:srgbClr val="1F1F1F"/>
               </a:solidFill>
@@ -26099,14 +26171,14 @@
               <a:buChar char="●"/>
             </a:pPr>
             <a:r>
-              <a:rPr lang="en-GB" sz="1800">
+              <a:rPr lang="en-GB" sz="1800" dirty="0">
                 <a:solidFill>
                   <a:srgbClr val="1F1F1F"/>
                 </a:solidFill>
               </a:rPr>
               <a:t>Interactivity and User Experience: Incorporate interactive features like hover effects, tooltips, and clickable elements to provide a smooth and engaging user experience. Allow users to interact with the dashboard and explore the data based on their specific needs.</a:t>
             </a:r>
-            <a:endParaRPr sz="1800">
+            <a:endParaRPr sz="1800" dirty="0">
               <a:solidFill>
                 <a:srgbClr val="1F1F1F"/>
               </a:solidFill>

</xml_diff>